<commit_message>
updated slides and codes for data type
</commit_message>
<xml_diff>
--- a/slides/2_data_types.pptx
+++ b/slides/2_data_types.pptx
@@ -5552,7 +5552,7 @@
                 <a:cs typeface="Courier New" panose="02070309020205020404" pitchFamily="49" charset="0"/>
                 <a:sym typeface="Wingdings" pitchFamily="2" charset="2"/>
               </a:rPr>
-              <a:t>Dictionaries are sets of key-element pairs. </a:t>
+              <a:t>Dictionaries are sets of key-value pairs. </a:t>
             </a:r>
           </a:p>
           <a:p>
@@ -7723,21 +7723,8 @@
                   <a:srgbClr val="000000"/>
                 </a:solidFill>
               </a:rPr>
-              <a:t>Write a program that asks the </a:t>
-            </a:r>
-            <a:r>
-              <a:rPr lang="en-US" sz="1600" spc="-1">
-                <a:solidFill>
-                  <a:srgbClr val="000000"/>
-                </a:solidFill>
-              </a:rPr>
-              <a:t>user…</a:t>
-            </a:r>
-            <a:endParaRPr lang="en-US" sz="1600" spc="-1" dirty="0">
-              <a:solidFill>
-                <a:srgbClr val="000000"/>
-              </a:solidFill>
-            </a:endParaRPr>
+              <a:t>Write a program that asks the user…</a:t>
+            </a:r>
           </a:p>
           <a:p>
             <a:pPr marL="781200" lvl="3" indent="-323280">
@@ -10004,7 +9991,7 @@
           <p:nvPr>
             <p:extLst>
               <p:ext uri="{D42A27DB-BD31-4B8C-83A1-F6EECF244321}">
-                <p14:modId xmlns:p14="http://schemas.microsoft.com/office/powerpoint/2010/main" val="2692351030"/>
+                <p14:modId xmlns:p14="http://schemas.microsoft.com/office/powerpoint/2010/main" val="2693940912"/>
               </p:ext>
             </p:extLst>
           </p:nvPr>

</xml_diff>